<commit_message>
Updates for next seminar
</commit_message>
<xml_diff>
--- a/EC_title.pptx
+++ b/EC_title.pptx
@@ -104,6 +104,11 @@
       </a:defRPr>
     </a:lvl9pPr>
   </p:defaultTextStyle>
+  <p:extLst>
+    <p:ext uri="{EFAFB233-063F-42B5-8137-9DF3F51BA10A}">
+      <p15:sldGuideLst xmlns:p15="http://schemas.microsoft.com/office/powerpoint/2012/main"/>
+    </p:ext>
+  </p:extLst>
 </p:presentation>
 </file>
 
@@ -256,7 +261,7 @@
           <a:p>
             <a:fld id="{109F1921-ADCD-4AA0-9219-7554B201AD5B}" type="datetimeFigureOut">
               <a:rPr lang="en-CA" smtClean="0"/>
-              <a:t>2022-02-04</a:t>
+              <a:t>2022-03-02</a:t>
             </a:fld>
             <a:endParaRPr lang="en-CA"/>
           </a:p>
@@ -456,7 +461,7 @@
           <a:p>
             <a:fld id="{109F1921-ADCD-4AA0-9219-7554B201AD5B}" type="datetimeFigureOut">
               <a:rPr lang="en-CA" smtClean="0"/>
-              <a:t>2022-02-04</a:t>
+              <a:t>2022-03-02</a:t>
             </a:fld>
             <a:endParaRPr lang="en-CA"/>
           </a:p>
@@ -666,7 +671,7 @@
           <a:p>
             <a:fld id="{109F1921-ADCD-4AA0-9219-7554B201AD5B}" type="datetimeFigureOut">
               <a:rPr lang="en-CA" smtClean="0"/>
-              <a:t>2022-02-04</a:t>
+              <a:t>2022-03-02</a:t>
             </a:fld>
             <a:endParaRPr lang="en-CA"/>
           </a:p>
@@ -866,7 +871,7 @@
           <a:p>
             <a:fld id="{109F1921-ADCD-4AA0-9219-7554B201AD5B}" type="datetimeFigureOut">
               <a:rPr lang="en-CA" smtClean="0"/>
-              <a:t>2022-02-04</a:t>
+              <a:t>2022-03-02</a:t>
             </a:fld>
             <a:endParaRPr lang="en-CA"/>
           </a:p>
@@ -1142,7 +1147,7 @@
           <a:p>
             <a:fld id="{109F1921-ADCD-4AA0-9219-7554B201AD5B}" type="datetimeFigureOut">
               <a:rPr lang="en-CA" smtClean="0"/>
-              <a:t>2022-02-04</a:t>
+              <a:t>2022-03-02</a:t>
             </a:fld>
             <a:endParaRPr lang="en-CA"/>
           </a:p>
@@ -1410,7 +1415,7 @@
           <a:p>
             <a:fld id="{109F1921-ADCD-4AA0-9219-7554B201AD5B}" type="datetimeFigureOut">
               <a:rPr lang="en-CA" smtClean="0"/>
-              <a:t>2022-02-04</a:t>
+              <a:t>2022-03-02</a:t>
             </a:fld>
             <a:endParaRPr lang="en-CA"/>
           </a:p>
@@ -1825,7 +1830,7 @@
           <a:p>
             <a:fld id="{109F1921-ADCD-4AA0-9219-7554B201AD5B}" type="datetimeFigureOut">
               <a:rPr lang="en-CA" smtClean="0"/>
-              <a:t>2022-02-04</a:t>
+              <a:t>2022-03-02</a:t>
             </a:fld>
             <a:endParaRPr lang="en-CA"/>
           </a:p>
@@ -1967,7 +1972,7 @@
           <a:p>
             <a:fld id="{109F1921-ADCD-4AA0-9219-7554B201AD5B}" type="datetimeFigureOut">
               <a:rPr lang="en-CA" smtClean="0"/>
-              <a:t>2022-02-04</a:t>
+              <a:t>2022-03-02</a:t>
             </a:fld>
             <a:endParaRPr lang="en-CA"/>
           </a:p>
@@ -2080,7 +2085,7 @@
           <a:p>
             <a:fld id="{109F1921-ADCD-4AA0-9219-7554B201AD5B}" type="datetimeFigureOut">
               <a:rPr lang="en-CA" smtClean="0"/>
-              <a:t>2022-02-04</a:t>
+              <a:t>2022-03-02</a:t>
             </a:fld>
             <a:endParaRPr lang="en-CA"/>
           </a:p>
@@ -2393,7 +2398,7 @@
           <a:p>
             <a:fld id="{109F1921-ADCD-4AA0-9219-7554B201AD5B}" type="datetimeFigureOut">
               <a:rPr lang="en-CA" smtClean="0"/>
-              <a:t>2022-02-04</a:t>
+              <a:t>2022-03-02</a:t>
             </a:fld>
             <a:endParaRPr lang="en-CA"/>
           </a:p>
@@ -2682,7 +2687,7 @@
           <a:p>
             <a:fld id="{109F1921-ADCD-4AA0-9219-7554B201AD5B}" type="datetimeFigureOut">
               <a:rPr lang="en-CA" smtClean="0"/>
-              <a:t>2022-02-04</a:t>
+              <a:t>2022-03-02</a:t>
             </a:fld>
             <a:endParaRPr lang="en-CA"/>
           </a:p>
@@ -2925,7 +2930,7 @@
           <a:p>
             <a:fld id="{109F1921-ADCD-4AA0-9219-7554B201AD5B}" type="datetimeFigureOut">
               <a:rPr lang="en-CA" smtClean="0"/>
-              <a:t>2022-02-04</a:t>
+              <a:t>2022-03-02</a:t>
             </a:fld>
             <a:endParaRPr lang="en-CA"/>
           </a:p>
@@ -3872,8 +3877,8 @@
         </p:nvSpPr>
         <p:spPr>
           <a:xfrm>
-            <a:off x="973248" y="2722114"/>
-            <a:ext cx="4363770" cy="1163817"/>
+            <a:off x="954992" y="2877909"/>
+            <a:ext cx="4363770" cy="1278810"/>
           </a:xfrm>
         </p:spPr>
         <p:txBody>
@@ -3882,6 +3887,16 @@
           </a:bodyPr>
           <a:lstStyle/>
           <a:p>
+            <a:r>
+              <a:rPr lang="en-US" sz="3100" b="1" i="0" dirty="0" err="1">
+                <a:solidFill>
+                  <a:srgbClr val="FFFFFF"/>
+                </a:solidFill>
+                <a:effectLst/>
+                <a:latin typeface="Roboto" panose="02000000000000000000" pitchFamily="2" charset="0"/>
+              </a:rPr>
+              <a:t>Nithin</a:t>
+            </a:r>
             <a:r>
               <a:rPr lang="en-US" sz="3100" b="1" i="0" dirty="0">
                 <a:solidFill>
@@ -3890,7 +3905,17 @@
                 <a:effectLst/>
                 <a:latin typeface="Roboto" panose="02000000000000000000" pitchFamily="2" charset="0"/>
               </a:rPr>
-              <a:t>Riley Troyer </a:t>
+              <a:t> </a:t>
+            </a:r>
+            <a:r>
+              <a:rPr lang="en-US" sz="3100" b="1" i="0" dirty="0" err="1">
+                <a:solidFill>
+                  <a:srgbClr val="FFFFFF"/>
+                </a:solidFill>
+                <a:effectLst/>
+                <a:latin typeface="Roboto" panose="02000000000000000000" pitchFamily="2" charset="0"/>
+              </a:rPr>
+              <a:t>Sividas</a:t>
             </a:r>
             <a:br>
               <a:rPr lang="en-US" sz="2800" b="0" i="0" dirty="0">
@@ -3909,7 +3934,7 @@
                 <a:effectLst/>
                 <a:latin typeface="Roboto" panose="02000000000000000000" pitchFamily="2" charset="0"/>
               </a:rPr>
-              <a:t>Substorm Activity as a Driver of Energetic Pulsating Aurora</a:t>
+              <a:t>Uncertainty in the solar wind propagation may explain polar cap potential saturation</a:t>
             </a:r>
             <a:endParaRPr lang="en-CA" sz="2400" dirty="0">
               <a:solidFill>
@@ -4139,7 +4164,7 @@
         </p:nvSpPr>
         <p:spPr>
           <a:xfrm>
-            <a:off x="1693885" y="4317148"/>
+            <a:off x="1693885" y="4371466"/>
             <a:ext cx="3447287" cy="892504"/>
           </a:xfrm>
         </p:spPr>
@@ -4305,8 +4330,8 @@
         </p:nvSpPr>
         <p:spPr>
           <a:xfrm>
-            <a:off x="954992" y="1213166"/>
-            <a:ext cx="4363770" cy="1163817"/>
+            <a:off x="954992" y="1121620"/>
+            <a:ext cx="4363770" cy="1559647"/>
           </a:xfrm>
           <a:prstGeom prst="rect">
             <a:avLst/>
@@ -4337,22 +4362,22 @@
           </a:lstStyle>
           <a:p>
             <a:r>
+              <a:rPr lang="en-US" sz="2900" b="1" dirty="0" err="1">
+                <a:solidFill>
+                  <a:srgbClr val="FFFFFF"/>
+                </a:solidFill>
+                <a:latin typeface="Roboto" panose="02000000000000000000" pitchFamily="2" charset="0"/>
+              </a:rPr>
+              <a:t>Leng</a:t>
+            </a:r>
+            <a:r>
               <a:rPr lang="en-US" sz="2900" b="1" dirty="0">
                 <a:solidFill>
                   <a:srgbClr val="FFFFFF"/>
                 </a:solidFill>
                 <a:latin typeface="Roboto" panose="02000000000000000000" pitchFamily="2" charset="0"/>
               </a:rPr>
-              <a:t>Leon </a:t>
-            </a:r>
-            <a:r>
-              <a:rPr lang="en-US" sz="2900" b="1" dirty="0" err="1">
-                <a:solidFill>
-                  <a:srgbClr val="FFFFFF"/>
-                </a:solidFill>
-                <a:latin typeface="Roboto" panose="02000000000000000000" pitchFamily="2" charset="0"/>
-              </a:rPr>
-              <a:t>Olifer</a:t>
+              <a:t> Ying Khoo</a:t>
             </a:r>
             <a:br>
               <a:rPr lang="en-US" sz="2800" dirty="0">
@@ -4363,26 +4388,37 @@
               </a:rPr>
             </a:br>
             <a:r>
-              <a:rPr lang="en-US" sz="2300" dirty="0">
+              <a:rPr lang="en-US" sz="2500" dirty="0">
                 <a:solidFill>
                   <a:srgbClr val="FFFFFF"/>
                 </a:solidFill>
                 <a:latin typeface="Roboto" panose="02000000000000000000" pitchFamily="2" charset="0"/>
               </a:rPr>
-              <a:t>Space Radiation: </a:t>
-            </a:r>
-          </a:p>
-          <a:p>
-            <a:r>
-              <a:rPr lang="en-US" sz="2300" dirty="0">
+              <a:t>On the challenges of </a:t>
+            </a:r>
+          </a:p>
+          <a:p>
+            <a:r>
+              <a:rPr lang="en-US" sz="2500" dirty="0">
                 <a:solidFill>
                   <a:srgbClr val="FFFFFF"/>
                 </a:solidFill>
                 <a:latin typeface="Roboto" panose="02000000000000000000" pitchFamily="2" charset="0"/>
               </a:rPr>
-              <a:t>How Bad Can It Get? </a:t>
-            </a:r>
-            <a:endParaRPr lang="en-CA" sz="2300" dirty="0">
+              <a:t>measuring energetic </a:t>
+            </a:r>
+          </a:p>
+          <a:p>
+            <a:r>
+              <a:rPr lang="en-US" sz="2500" dirty="0">
+                <a:solidFill>
+                  <a:srgbClr val="FFFFFF"/>
+                </a:solidFill>
+                <a:latin typeface="Roboto" panose="02000000000000000000" pitchFamily="2" charset="0"/>
+              </a:rPr>
+              <a:t>particles in the inner belt</a:t>
+            </a:r>
+            <a:endParaRPr lang="en-CA" sz="2500" dirty="0">
               <a:solidFill>
                 <a:schemeClr val="bg1"/>
               </a:solidFill>
@@ -4404,7 +4440,7 @@
         </p:nvCxnSpPr>
         <p:spPr>
           <a:xfrm>
-            <a:off x="1276539" y="2555913"/>
+            <a:off x="1240326" y="2752110"/>
             <a:ext cx="3757188" cy="0"/>
           </a:xfrm>
           <a:prstGeom prst="line">
@@ -4447,7 +4483,7 @@
         </p:nvCxnSpPr>
         <p:spPr>
           <a:xfrm>
-            <a:off x="1383984" y="4101539"/>
+            <a:off x="1374930" y="4246417"/>
             <a:ext cx="2518060" cy="0"/>
           </a:xfrm>
           <a:prstGeom prst="line">

</xml_diff>

<commit_message>
update for next seminar
</commit_message>
<xml_diff>
--- a/EC_title.pptx
+++ b/EC_title.pptx
@@ -261,7 +261,7 @@
           <a:p>
             <a:fld id="{109F1921-ADCD-4AA0-9219-7554B201AD5B}" type="datetimeFigureOut">
               <a:rPr lang="en-CA" smtClean="0"/>
-              <a:t>2022-04-03</a:t>
+              <a:t>2022-05-01</a:t>
             </a:fld>
             <a:endParaRPr lang="en-CA"/>
           </a:p>
@@ -461,7 +461,7 @@
           <a:p>
             <a:fld id="{109F1921-ADCD-4AA0-9219-7554B201AD5B}" type="datetimeFigureOut">
               <a:rPr lang="en-CA" smtClean="0"/>
-              <a:t>2022-04-03</a:t>
+              <a:t>2022-05-01</a:t>
             </a:fld>
             <a:endParaRPr lang="en-CA"/>
           </a:p>
@@ -671,7 +671,7 @@
           <a:p>
             <a:fld id="{109F1921-ADCD-4AA0-9219-7554B201AD5B}" type="datetimeFigureOut">
               <a:rPr lang="en-CA" smtClean="0"/>
-              <a:t>2022-04-03</a:t>
+              <a:t>2022-05-01</a:t>
             </a:fld>
             <a:endParaRPr lang="en-CA"/>
           </a:p>
@@ -871,7 +871,7 @@
           <a:p>
             <a:fld id="{109F1921-ADCD-4AA0-9219-7554B201AD5B}" type="datetimeFigureOut">
               <a:rPr lang="en-CA" smtClean="0"/>
-              <a:t>2022-04-03</a:t>
+              <a:t>2022-05-01</a:t>
             </a:fld>
             <a:endParaRPr lang="en-CA"/>
           </a:p>
@@ -1147,7 +1147,7 @@
           <a:p>
             <a:fld id="{109F1921-ADCD-4AA0-9219-7554B201AD5B}" type="datetimeFigureOut">
               <a:rPr lang="en-CA" smtClean="0"/>
-              <a:t>2022-04-03</a:t>
+              <a:t>2022-05-01</a:t>
             </a:fld>
             <a:endParaRPr lang="en-CA"/>
           </a:p>
@@ -1415,7 +1415,7 @@
           <a:p>
             <a:fld id="{109F1921-ADCD-4AA0-9219-7554B201AD5B}" type="datetimeFigureOut">
               <a:rPr lang="en-CA" smtClean="0"/>
-              <a:t>2022-04-03</a:t>
+              <a:t>2022-05-01</a:t>
             </a:fld>
             <a:endParaRPr lang="en-CA"/>
           </a:p>
@@ -1830,7 +1830,7 @@
           <a:p>
             <a:fld id="{109F1921-ADCD-4AA0-9219-7554B201AD5B}" type="datetimeFigureOut">
               <a:rPr lang="en-CA" smtClean="0"/>
-              <a:t>2022-04-03</a:t>
+              <a:t>2022-05-01</a:t>
             </a:fld>
             <a:endParaRPr lang="en-CA"/>
           </a:p>
@@ -1972,7 +1972,7 @@
           <a:p>
             <a:fld id="{109F1921-ADCD-4AA0-9219-7554B201AD5B}" type="datetimeFigureOut">
               <a:rPr lang="en-CA" smtClean="0"/>
-              <a:t>2022-04-03</a:t>
+              <a:t>2022-05-01</a:t>
             </a:fld>
             <a:endParaRPr lang="en-CA"/>
           </a:p>
@@ -2085,7 +2085,7 @@
           <a:p>
             <a:fld id="{109F1921-ADCD-4AA0-9219-7554B201AD5B}" type="datetimeFigureOut">
               <a:rPr lang="en-CA" smtClean="0"/>
-              <a:t>2022-04-03</a:t>
+              <a:t>2022-05-01</a:t>
             </a:fld>
             <a:endParaRPr lang="en-CA"/>
           </a:p>
@@ -2398,7 +2398,7 @@
           <a:p>
             <a:fld id="{109F1921-ADCD-4AA0-9219-7554B201AD5B}" type="datetimeFigureOut">
               <a:rPr lang="en-CA" smtClean="0"/>
-              <a:t>2022-04-03</a:t>
+              <a:t>2022-05-01</a:t>
             </a:fld>
             <a:endParaRPr lang="en-CA"/>
           </a:p>
@@ -2687,7 +2687,7 @@
           <a:p>
             <a:fld id="{109F1921-ADCD-4AA0-9219-7554B201AD5B}" type="datetimeFigureOut">
               <a:rPr lang="en-CA" smtClean="0"/>
-              <a:t>2022-04-03</a:t>
+              <a:t>2022-05-01</a:t>
             </a:fld>
             <a:endParaRPr lang="en-CA"/>
           </a:p>
@@ -2930,7 +2930,7 @@
           <a:p>
             <a:fld id="{109F1921-ADCD-4AA0-9219-7554B201AD5B}" type="datetimeFigureOut">
               <a:rPr lang="en-CA" smtClean="0"/>
-              <a:t>2022-04-03</a:t>
+              <a:t>2022-05-01</a:t>
             </a:fld>
             <a:endParaRPr lang="en-CA"/>
           </a:p>
@@ -3877,13 +3877,13 @@
         </p:nvSpPr>
         <p:spPr>
           <a:xfrm>
-            <a:off x="954992" y="2877909"/>
+            <a:off x="955531" y="2822638"/>
             <a:ext cx="4363770" cy="1278810"/>
           </a:xfrm>
         </p:spPr>
         <p:txBody>
           <a:bodyPr anchor="b">
-            <a:normAutofit fontScale="90000"/>
+            <a:normAutofit/>
           </a:bodyPr>
           <a:lstStyle/>
           <a:p>
@@ -3895,7 +3895,7 @@
                 <a:effectLst/>
                 <a:latin typeface="Roboto" panose="02000000000000000000" pitchFamily="2" charset="0"/>
               </a:rPr>
-              <a:t>Man Hua</a:t>
+              <a:t>Xi Lu</a:t>
             </a:r>
             <a:br>
               <a:rPr lang="en-US" sz="2800" b="0" i="0" dirty="0">
@@ -3914,7 +3914,7 @@
                 <a:effectLst/>
                 <a:latin typeface="Roboto" panose="02000000000000000000" pitchFamily="2" charset="0"/>
               </a:rPr>
-              <a:t>Radiation Belt Electron Acceleration Driven by Very-Low-Frequency Transmitter Waves in Near-Earth Space</a:t>
+              <a:t>Statistical Study of Foreshock Density Holes</a:t>
             </a:r>
             <a:endParaRPr lang="en-CA" sz="2400" dirty="0">
               <a:solidFill>
@@ -4310,8 +4310,8 @@
         </p:nvSpPr>
         <p:spPr>
           <a:xfrm>
-            <a:off x="937035" y="858078"/>
-            <a:ext cx="4363770" cy="1559647"/>
+            <a:off x="897122" y="721045"/>
+            <a:ext cx="4363770" cy="1897487"/>
           </a:xfrm>
           <a:prstGeom prst="rect">
             <a:avLst/>
@@ -4348,16 +4348,7 @@
                 </a:solidFill>
                 <a:latin typeface="Roboto" panose="02000000000000000000" pitchFamily="2" charset="0"/>
               </a:rPr>
-              <a:t>Ramiz </a:t>
-            </a:r>
-            <a:r>
-              <a:rPr lang="en-US" sz="2900" b="1" dirty="0" err="1">
-                <a:solidFill>
-                  <a:srgbClr val="FFFFFF"/>
-                </a:solidFill>
-                <a:latin typeface="Roboto" panose="02000000000000000000" pitchFamily="2" charset="0"/>
-              </a:rPr>
-              <a:t>Qudsi</a:t>
+              <a:t>Connor O'Brien</a:t>
             </a:r>
             <a:br>
               <a:rPr lang="en-US" sz="2800" dirty="0">
@@ -4374,7 +4365,7 @@
                 </a:solidFill>
                 <a:latin typeface="Roboto" panose="02000000000000000000" pitchFamily="2" charset="0"/>
               </a:rPr>
-              <a:t>Refining predictions of </a:t>
+              <a:t>Neural Network Models </a:t>
             </a:r>
           </a:p>
           <a:p>
@@ -4385,7 +4376,7 @@
                 </a:solidFill>
                 <a:latin typeface="Roboto" panose="02000000000000000000" pitchFamily="2" charset="0"/>
               </a:rPr>
-              <a:t>reconnection X-lines </a:t>
+              <a:t>of the Near-Earth Solar Wind </a:t>
             </a:r>
           </a:p>
           <a:p>
@@ -4396,7 +4387,7 @@
                 </a:solidFill>
                 <a:latin typeface="Roboto" panose="02000000000000000000" pitchFamily="2" charset="0"/>
               </a:rPr>
-              <a:t>at Earth’s Magnetopause</a:t>
+              <a:t>and Magnetosheath</a:t>
             </a:r>
             <a:endParaRPr lang="en-CA" sz="2100" dirty="0">
               <a:solidFill>
@@ -4420,7 +4411,7 @@
         </p:nvCxnSpPr>
         <p:spPr>
           <a:xfrm>
-            <a:off x="1240326" y="2523508"/>
+            <a:off x="1200413" y="2763500"/>
             <a:ext cx="3757188" cy="0"/>
           </a:xfrm>
           <a:prstGeom prst="line">

</xml_diff>

<commit_message>
Update for next semianr
</commit_message>
<xml_diff>
--- a/EC_title.pptx
+++ b/EC_title.pptx
@@ -261,7 +261,7 @@
           <a:p>
             <a:fld id="{109F1921-ADCD-4AA0-9219-7554B201AD5B}" type="datetimeFigureOut">
               <a:rPr lang="en-CA" smtClean="0"/>
-              <a:t>2022-05-01</a:t>
+              <a:t>2023-02-12</a:t>
             </a:fld>
             <a:endParaRPr lang="en-CA"/>
           </a:p>
@@ -461,7 +461,7 @@
           <a:p>
             <a:fld id="{109F1921-ADCD-4AA0-9219-7554B201AD5B}" type="datetimeFigureOut">
               <a:rPr lang="en-CA" smtClean="0"/>
-              <a:t>2022-05-01</a:t>
+              <a:t>2023-02-12</a:t>
             </a:fld>
             <a:endParaRPr lang="en-CA"/>
           </a:p>
@@ -671,7 +671,7 @@
           <a:p>
             <a:fld id="{109F1921-ADCD-4AA0-9219-7554B201AD5B}" type="datetimeFigureOut">
               <a:rPr lang="en-CA" smtClean="0"/>
-              <a:t>2022-05-01</a:t>
+              <a:t>2023-02-12</a:t>
             </a:fld>
             <a:endParaRPr lang="en-CA"/>
           </a:p>
@@ -871,7 +871,7 @@
           <a:p>
             <a:fld id="{109F1921-ADCD-4AA0-9219-7554B201AD5B}" type="datetimeFigureOut">
               <a:rPr lang="en-CA" smtClean="0"/>
-              <a:t>2022-05-01</a:t>
+              <a:t>2023-02-12</a:t>
             </a:fld>
             <a:endParaRPr lang="en-CA"/>
           </a:p>
@@ -1147,7 +1147,7 @@
           <a:p>
             <a:fld id="{109F1921-ADCD-4AA0-9219-7554B201AD5B}" type="datetimeFigureOut">
               <a:rPr lang="en-CA" smtClean="0"/>
-              <a:t>2022-05-01</a:t>
+              <a:t>2023-02-12</a:t>
             </a:fld>
             <a:endParaRPr lang="en-CA"/>
           </a:p>
@@ -1415,7 +1415,7 @@
           <a:p>
             <a:fld id="{109F1921-ADCD-4AA0-9219-7554B201AD5B}" type="datetimeFigureOut">
               <a:rPr lang="en-CA" smtClean="0"/>
-              <a:t>2022-05-01</a:t>
+              <a:t>2023-02-12</a:t>
             </a:fld>
             <a:endParaRPr lang="en-CA"/>
           </a:p>
@@ -1830,7 +1830,7 @@
           <a:p>
             <a:fld id="{109F1921-ADCD-4AA0-9219-7554B201AD5B}" type="datetimeFigureOut">
               <a:rPr lang="en-CA" smtClean="0"/>
-              <a:t>2022-05-01</a:t>
+              <a:t>2023-02-12</a:t>
             </a:fld>
             <a:endParaRPr lang="en-CA"/>
           </a:p>
@@ -1972,7 +1972,7 @@
           <a:p>
             <a:fld id="{109F1921-ADCD-4AA0-9219-7554B201AD5B}" type="datetimeFigureOut">
               <a:rPr lang="en-CA" smtClean="0"/>
-              <a:t>2022-05-01</a:t>
+              <a:t>2023-02-12</a:t>
             </a:fld>
             <a:endParaRPr lang="en-CA"/>
           </a:p>
@@ -2085,7 +2085,7 @@
           <a:p>
             <a:fld id="{109F1921-ADCD-4AA0-9219-7554B201AD5B}" type="datetimeFigureOut">
               <a:rPr lang="en-CA" smtClean="0"/>
-              <a:t>2022-05-01</a:t>
+              <a:t>2023-02-12</a:t>
             </a:fld>
             <a:endParaRPr lang="en-CA"/>
           </a:p>
@@ -2398,7 +2398,7 @@
           <a:p>
             <a:fld id="{109F1921-ADCD-4AA0-9219-7554B201AD5B}" type="datetimeFigureOut">
               <a:rPr lang="en-CA" smtClean="0"/>
-              <a:t>2022-05-01</a:t>
+              <a:t>2023-02-12</a:t>
             </a:fld>
             <a:endParaRPr lang="en-CA"/>
           </a:p>
@@ -2687,7 +2687,7 @@
           <a:p>
             <a:fld id="{109F1921-ADCD-4AA0-9219-7554B201AD5B}" type="datetimeFigureOut">
               <a:rPr lang="en-CA" smtClean="0"/>
-              <a:t>2022-05-01</a:t>
+              <a:t>2023-02-12</a:t>
             </a:fld>
             <a:endParaRPr lang="en-CA"/>
           </a:p>
@@ -2930,7 +2930,7 @@
           <a:p>
             <a:fld id="{109F1921-ADCD-4AA0-9219-7554B201AD5B}" type="datetimeFigureOut">
               <a:rPr lang="en-CA" smtClean="0"/>
-              <a:t>2022-05-01</a:t>
+              <a:t>2023-02-12</a:t>
             </a:fld>
             <a:endParaRPr lang="en-CA"/>
           </a:p>
@@ -3877,13 +3877,13 @@
         </p:nvSpPr>
         <p:spPr>
           <a:xfrm>
-            <a:off x="955531" y="2822638"/>
+            <a:off x="1001989" y="3034896"/>
             <a:ext cx="4363770" cy="1278810"/>
           </a:xfrm>
         </p:spPr>
         <p:txBody>
           <a:bodyPr anchor="b">
-            <a:normAutofit/>
+            <a:normAutofit fontScale="90000"/>
           </a:bodyPr>
           <a:lstStyle/>
           <a:p>
@@ -3895,7 +3895,17 @@
                 <a:effectLst/>
                 <a:latin typeface="Roboto" panose="02000000000000000000" pitchFamily="2" charset="0"/>
               </a:rPr>
-              <a:t>Xi Lu</a:t>
+              <a:t>Anthony </a:t>
+            </a:r>
+            <a:r>
+              <a:rPr lang="en-US" sz="3100" b="1" i="0" dirty="0" err="1">
+                <a:solidFill>
+                  <a:srgbClr val="FFFFFF"/>
+                </a:solidFill>
+                <a:effectLst/>
+                <a:latin typeface="Roboto" panose="02000000000000000000" pitchFamily="2" charset="0"/>
+              </a:rPr>
+              <a:t>Sciola</a:t>
             </a:r>
             <a:br>
               <a:rPr lang="en-US" sz="2800" b="0" i="0" dirty="0">
@@ -3914,7 +3924,7 @@
                 <a:effectLst/>
                 <a:latin typeface="Roboto" panose="02000000000000000000" pitchFamily="2" charset="0"/>
               </a:rPr>
-              <a:t>Statistical Study of Foreshock Density Holes</a:t>
+              <a:t>Build-up of the Storm-Time Ring Current via Mesoscale Plasma Sheet Flows</a:t>
             </a:r>
             <a:endParaRPr lang="en-CA" sz="2400" dirty="0">
               <a:solidFill>
@@ -4310,8 +4320,8 @@
         </p:nvSpPr>
         <p:spPr>
           <a:xfrm>
-            <a:off x="897122" y="721045"/>
-            <a:ext cx="4363770" cy="1897487"/>
+            <a:off x="952877" y="721045"/>
+            <a:ext cx="4363770" cy="2217100"/>
           </a:xfrm>
           <a:prstGeom prst="rect">
             <a:avLst/>
@@ -4348,7 +4358,7 @@
                 </a:solidFill>
                 <a:latin typeface="Roboto" panose="02000000000000000000" pitchFamily="2" charset="0"/>
               </a:rPr>
-              <a:t>Connor O'Brien</a:t>
+              <a:t>Dong Lin</a:t>
             </a:r>
             <a:br>
               <a:rPr lang="en-US" sz="2800" dirty="0">
@@ -4365,7 +4375,7 @@
                 </a:solidFill>
                 <a:latin typeface="Roboto" panose="02000000000000000000" pitchFamily="2" charset="0"/>
               </a:rPr>
-              <a:t>Neural Network Models </a:t>
+              <a:t>Characterizing Auroral </a:t>
             </a:r>
           </a:p>
           <a:p>
@@ -4376,7 +4386,7 @@
                 </a:solidFill>
                 <a:latin typeface="Roboto" panose="02000000000000000000" pitchFamily="2" charset="0"/>
               </a:rPr>
-              <a:t>of the Near-Earth Solar Wind </a:t>
+              <a:t>Precipitation and Ionospheric Conductance with the </a:t>
             </a:r>
           </a:p>
           <a:p>
@@ -4387,7 +4397,7 @@
                 </a:solidFill>
                 <a:latin typeface="Roboto" panose="02000000000000000000" pitchFamily="2" charset="0"/>
               </a:rPr>
-              <a:t>and Magnetosheath</a:t>
+              <a:t>Multiscale Atmosphere-Geospace Environment Model</a:t>
             </a:r>
             <a:endParaRPr lang="en-CA" sz="2100" dirty="0">
               <a:solidFill>
@@ -4411,7 +4421,7 @@
         </p:nvCxnSpPr>
         <p:spPr>
           <a:xfrm>
-            <a:off x="1200413" y="2763500"/>
+            <a:off x="1200413" y="2986520"/>
             <a:ext cx="3757188" cy="0"/>
           </a:xfrm>
           <a:prstGeom prst="line">

</xml_diff>